<commit_message>
Released last version of reports
</commit_message>
<xml_diff>
--- a/Презентация.pptx
+++ b/Презентация.pptx
@@ -262,8 +262,11 @@
     </a:lvl9pPr>
   </p:defaultTextStyle>
   <p:extLst>
+    <p:ext uri="{EFAFB233-063F-42B5-8137-9DF3F51BA10A}">
+      <p15:sldGuideLst xmlns:p15="http://schemas.microsoft.com/office/powerpoint/2012/main"/>
+    </p:ext>
     <p:ext uri="http://customooxmlschemas.google.com/">
-      <go:slidesCustomData xmlns:go="http://customooxmlschemas.google.com/" xmlns:ahyp="http://schemas.microsoft.com/office/drawing/2018/hyperlinkcolor" xmlns:p15="http://schemas.microsoft.com/office/powerpoint/2012/main" xmlns:p14="http://schemas.microsoft.com/office/powerpoint/2010/main" xmlns:com="http://schemas.openxmlformats.org/drawingml/2006/compatibility" xmlns:pvml="urn:schemas-microsoft-com:office:powerpoint" xmlns:v="urn:schemas-microsoft-com:vml" xmlns:o="urn:schemas-microsoft-com:office:office" xmlns:dgm="http://schemas.openxmlformats.org/drawingml/2006/diagram" xmlns:c="http://schemas.openxmlformats.org/drawingml/2006/chart" xmlns:mv="urn:schemas-microsoft-com:mac:vml" xmlns:mc="http://schemas.openxmlformats.org/markup-compatibility/2006" xmlns="" r:id="rId21" roundtripDataSignature="AMtx7mi7Dl426huJaAupFsMUqYZg/EYJKQ=="/>
+      <go:slidesCustomData xmlns="" xmlns:mc="http://schemas.openxmlformats.org/markup-compatibility/2006" xmlns:mv="urn:schemas-microsoft-com:mac:vml" xmlns:c="http://schemas.openxmlformats.org/drawingml/2006/chart" xmlns:dgm="http://schemas.openxmlformats.org/drawingml/2006/diagram" xmlns:o="urn:schemas-microsoft-com:office:office" xmlns:v="urn:schemas-microsoft-com:vml" xmlns:pvml="urn:schemas-microsoft-com:office:powerpoint" xmlns:com="http://schemas.openxmlformats.org/drawingml/2006/compatibility" xmlns:p14="http://schemas.microsoft.com/office/powerpoint/2010/main" xmlns:p15="http://schemas.microsoft.com/office/powerpoint/2012/main" xmlns:ahyp="http://schemas.microsoft.com/office/drawing/2018/hyperlinkcolor" xmlns:go="http://customooxmlschemas.google.com/" r:id="rId21" roundtripDataSignature="AMtx7mi7Dl426huJaAupFsMUqYZg/EYJKQ=="/>
     </p:ext>
   </p:extLst>
 </p:presentation>
@@ -12778,74 +12781,6 @@
           </a:p>
         </p:txBody>
       </p:sp>
-      <p:sp>
-        <p:nvSpPr>
-          <p:cNvPr id="147" name="Google Shape;147;p12"/>
-          <p:cNvSpPr txBox="1"/>
-          <p:nvPr/>
-        </p:nvSpPr>
-        <p:spPr>
-          <a:xfrm>
-            <a:off x="6288325" y="412025"/>
-            <a:ext cx="3296100" cy="708000"/>
-          </a:xfrm>
-          <a:prstGeom prst="rect">
-            <a:avLst/>
-          </a:prstGeom>
-          <a:solidFill>
-            <a:schemeClr val="dk1"/>
-          </a:solidFill>
-          <a:ln>
-            <a:noFill/>
-          </a:ln>
-        </p:spPr>
-        <p:txBody>
-          <a:bodyPr spcFirstLastPara="1" wrap="square" lIns="91425" tIns="91425" rIns="91425" bIns="91425" anchor="t" anchorCtr="0">
-            <a:spAutoFit/>
-          </a:bodyPr>
-          <a:lstStyle/>
-          <a:p>
-            <a:pPr marL="0" marR="0" lvl="0" indent="0" algn="r" rtl="0">
-              <a:lnSpc>
-                <a:spcPct val="100000"/>
-              </a:lnSpc>
-              <a:spcBef>
-                <a:spcPts val="0"/>
-              </a:spcBef>
-              <a:spcAft>
-                <a:spcPts val="0"/>
-              </a:spcAft>
-              <a:buClr>
-                <a:srgbClr val="000000"/>
-              </a:buClr>
-              <a:buSzPts val="3400"/>
-              <a:buFont typeface="Arial"/>
-              <a:buNone/>
-            </a:pPr>
-            <a:r>
-              <a:rPr lang="ru-RU" sz="3400" b="0" i="0" u="none" strike="noStrike" cap="none">
-                <a:solidFill>
-                  <a:srgbClr val="FFFFFF"/>
-                </a:solidFill>
-                <a:latin typeface="Roboto"/>
-                <a:ea typeface="Roboto"/>
-                <a:cs typeface="Roboto"/>
-                <a:sym typeface="Roboto"/>
-              </a:rPr>
-              <a:t>Тестирование</a:t>
-            </a:r>
-            <a:endParaRPr sz="3400" b="0" i="0" u="none" strike="noStrike" cap="none">
-              <a:solidFill>
-                <a:srgbClr val="FFFFFF"/>
-              </a:solidFill>
-              <a:latin typeface="Roboto"/>
-              <a:ea typeface="Roboto"/>
-              <a:cs typeface="Roboto"/>
-              <a:sym typeface="Roboto"/>
-            </a:endParaRPr>
-          </a:p>
-        </p:txBody>
-      </p:sp>
     </p:spTree>
   </p:cSld>
   <p:clrMapOvr>

</xml_diff>